<commit_message>
update ppt and add coding to linear regression
</commit_message>
<xml_diff>
--- a/PPT/양시몬_비만도가_타자에게미치는영향.pptx
+++ b/PPT/양시몬_비만도가_타자에게미치는영향.pptx
@@ -13,7 +13,8 @@
     <p:sldId id="271" r:id="rId7"/>
     <p:sldId id="276" r:id="rId8"/>
     <p:sldId id="275" r:id="rId9"/>
-    <p:sldId id="267" r:id="rId10"/>
+    <p:sldId id="277" r:id="rId10"/>
+    <p:sldId id="267" r:id="rId11"/>
   </p:sldIdLst>
   <p:sldSz cx="12192000" cy="6858000"/>
   <p:notesSz cx="6858000" cy="9144000"/>
@@ -359,9 +360,9 @@
               <a:pPr>
                 <a:defRPr/>
               </a:pPr>
-              <a:t>2020-09-06</a:t>
+              <a:t>2020-09-07</a:t>
             </a:fld>
-            <a:endParaRPr lang="ko-KR" altLang="en-US"/>
+            <a:endParaRPr lang="ko-KR" altLang="en-US" dirty="0"/>
           </a:p>
         </p:txBody>
       </p:sp>
@@ -393,7 +394,7 @@
             <a:pPr>
               <a:defRPr/>
             </a:pPr>
-            <a:endParaRPr lang="ko-KR" altLang="en-US"/>
+            <a:endParaRPr lang="ko-KR" altLang="en-US" dirty="0"/>
           </a:p>
         </p:txBody>
       </p:sp>
@@ -432,7 +433,7 @@
               </a:pPr>
               <a:t>‹#›</a:t>
             </a:fld>
-            <a:endParaRPr lang="ko-KR" altLang="en-US"/>
+            <a:endParaRPr lang="ko-KR" altLang="en-US" dirty="0"/>
           </a:p>
         </p:txBody>
       </p:sp>
@@ -572,9 +573,9 @@
               <a:pPr>
                 <a:defRPr/>
               </a:pPr>
-              <a:t>2020-09-06</a:t>
+              <a:t>2020-09-07</a:t>
             </a:fld>
-            <a:endParaRPr lang="ko-KR" altLang="en-US"/>
+            <a:endParaRPr lang="ko-KR" altLang="en-US" dirty="0"/>
           </a:p>
         </p:txBody>
       </p:sp>
@@ -606,7 +607,7 @@
             <a:pPr>
               <a:defRPr/>
             </a:pPr>
-            <a:endParaRPr lang="ko-KR" altLang="en-US"/>
+            <a:endParaRPr lang="ko-KR" altLang="en-US" dirty="0"/>
           </a:p>
         </p:txBody>
       </p:sp>
@@ -645,7 +646,7 @@
               </a:pPr>
               <a:t>‹#›</a:t>
             </a:fld>
-            <a:endParaRPr lang="ko-KR" altLang="en-US"/>
+            <a:endParaRPr lang="ko-KR" altLang="en-US" dirty="0"/>
           </a:p>
         </p:txBody>
       </p:sp>
@@ -795,9 +796,9 @@
               <a:pPr>
                 <a:defRPr/>
               </a:pPr>
-              <a:t>2020-09-06</a:t>
+              <a:t>2020-09-07</a:t>
             </a:fld>
-            <a:endParaRPr lang="ko-KR" altLang="en-US"/>
+            <a:endParaRPr lang="ko-KR" altLang="en-US" dirty="0"/>
           </a:p>
         </p:txBody>
       </p:sp>
@@ -829,7 +830,7 @@
             <a:pPr>
               <a:defRPr/>
             </a:pPr>
-            <a:endParaRPr lang="ko-KR" altLang="en-US"/>
+            <a:endParaRPr lang="ko-KR" altLang="en-US" dirty="0"/>
           </a:p>
         </p:txBody>
       </p:sp>
@@ -868,7 +869,7 @@
               </a:pPr>
               <a:t>‹#›</a:t>
             </a:fld>
-            <a:endParaRPr lang="ko-KR" altLang="en-US"/>
+            <a:endParaRPr lang="ko-KR" altLang="en-US" dirty="0"/>
           </a:p>
         </p:txBody>
       </p:sp>
@@ -997,7 +998,7 @@
               </a:spcAft>
               <a:defRPr/>
             </a:pPr>
-            <a:endParaRPr lang="ko-KR" altLang="en-US"/>
+            <a:endParaRPr lang="ko-KR" altLang="en-US" dirty="0"/>
           </a:p>
         </p:txBody>
       </p:sp>
@@ -1059,7 +1060,7 @@
               </a:spcAft>
               <a:defRPr/>
             </a:pPr>
-            <a:endParaRPr lang="ko-KR" altLang="en-US"/>
+            <a:endParaRPr lang="ko-KR" altLang="en-US" dirty="0"/>
           </a:p>
         </p:txBody>
       </p:sp>
@@ -1121,7 +1122,7 @@
               </a:spcAft>
               <a:defRPr/>
             </a:pPr>
-            <a:endParaRPr lang="ko-KR" altLang="en-US"/>
+            <a:endParaRPr lang="ko-KR" altLang="en-US" dirty="0"/>
           </a:p>
         </p:txBody>
       </p:sp>
@@ -1338,9 +1339,9 @@
               <a:pPr>
                 <a:defRPr/>
               </a:pPr>
-              <a:t>2020-09-06</a:t>
+              <a:t>2020-09-07</a:t>
             </a:fld>
-            <a:endParaRPr lang="ko-KR" altLang="en-US"/>
+            <a:endParaRPr lang="ko-KR" altLang="en-US" dirty="0"/>
           </a:p>
         </p:txBody>
       </p:sp>
@@ -1372,7 +1373,7 @@
             <a:pPr>
               <a:defRPr/>
             </a:pPr>
-            <a:endParaRPr lang="ko-KR" altLang="en-US"/>
+            <a:endParaRPr lang="ko-KR" altLang="en-US" dirty="0"/>
           </a:p>
         </p:txBody>
       </p:sp>
@@ -1411,7 +1412,7 @@
               </a:pPr>
               <a:t>‹#›</a:t>
             </a:fld>
-            <a:endParaRPr lang="ko-KR" altLang="en-US"/>
+            <a:endParaRPr lang="ko-KR" altLang="en-US" dirty="0"/>
           </a:p>
         </p:txBody>
       </p:sp>
@@ -1612,9 +1613,9 @@
               <a:pPr>
                 <a:defRPr/>
               </a:pPr>
-              <a:t>2020-09-06</a:t>
+              <a:t>2020-09-07</a:t>
             </a:fld>
-            <a:endParaRPr lang="ko-KR" altLang="en-US"/>
+            <a:endParaRPr lang="ko-KR" altLang="en-US" dirty="0"/>
           </a:p>
         </p:txBody>
       </p:sp>
@@ -1646,7 +1647,7 @@
             <a:pPr>
               <a:defRPr/>
             </a:pPr>
-            <a:endParaRPr lang="ko-KR" altLang="en-US"/>
+            <a:endParaRPr lang="ko-KR" altLang="en-US" dirty="0"/>
           </a:p>
         </p:txBody>
       </p:sp>
@@ -1685,7 +1686,7 @@
               </a:pPr>
               <a:t>‹#›</a:t>
             </a:fld>
-            <a:endParaRPr lang="ko-KR" altLang="en-US"/>
+            <a:endParaRPr lang="ko-KR" altLang="en-US" dirty="0"/>
           </a:p>
         </p:txBody>
       </p:sp>
@@ -2021,9 +2022,9 @@
               <a:pPr>
                 <a:defRPr/>
               </a:pPr>
-              <a:t>2020-09-06</a:t>
+              <a:t>2020-09-07</a:t>
             </a:fld>
-            <a:endParaRPr lang="ko-KR" altLang="en-US"/>
+            <a:endParaRPr lang="ko-KR" altLang="en-US" dirty="0"/>
           </a:p>
         </p:txBody>
       </p:sp>
@@ -2055,7 +2056,7 @@
             <a:pPr>
               <a:defRPr/>
             </a:pPr>
-            <a:endParaRPr lang="ko-KR" altLang="en-US"/>
+            <a:endParaRPr lang="ko-KR" altLang="en-US" dirty="0"/>
           </a:p>
         </p:txBody>
       </p:sp>
@@ -2094,7 +2095,7 @@
               </a:pPr>
               <a:t>‹#›</a:t>
             </a:fld>
-            <a:endParaRPr lang="ko-KR" altLang="en-US"/>
+            <a:endParaRPr lang="ko-KR" altLang="en-US" dirty="0"/>
           </a:p>
         </p:txBody>
       </p:sp>
@@ -2183,9 +2184,9 @@
               <a:pPr>
                 <a:defRPr/>
               </a:pPr>
-              <a:t>2020-09-06</a:t>
+              <a:t>2020-09-07</a:t>
             </a:fld>
-            <a:endParaRPr lang="ko-KR" altLang="en-US"/>
+            <a:endParaRPr lang="ko-KR" altLang="en-US" dirty="0"/>
           </a:p>
         </p:txBody>
       </p:sp>
@@ -2217,7 +2218,7 @@
             <a:pPr>
               <a:defRPr/>
             </a:pPr>
-            <a:endParaRPr lang="ko-KR" altLang="en-US"/>
+            <a:endParaRPr lang="ko-KR" altLang="en-US" dirty="0"/>
           </a:p>
         </p:txBody>
       </p:sp>
@@ -2256,7 +2257,7 @@
               </a:pPr>
               <a:t>‹#›</a:t>
             </a:fld>
-            <a:endParaRPr lang="ko-KR" altLang="en-US"/>
+            <a:endParaRPr lang="ko-KR" altLang="en-US" dirty="0"/>
           </a:p>
         </p:txBody>
       </p:sp>
@@ -2323,9 +2324,9 @@
               <a:pPr>
                 <a:defRPr/>
               </a:pPr>
-              <a:t>2020-09-06</a:t>
+              <a:t>2020-09-07</a:t>
             </a:fld>
-            <a:endParaRPr lang="ko-KR" altLang="en-US"/>
+            <a:endParaRPr lang="ko-KR" altLang="en-US" dirty="0"/>
           </a:p>
         </p:txBody>
       </p:sp>
@@ -2357,7 +2358,7 @@
             <a:pPr>
               <a:defRPr/>
             </a:pPr>
-            <a:endParaRPr lang="ko-KR" altLang="en-US"/>
+            <a:endParaRPr lang="ko-KR" altLang="en-US" dirty="0"/>
           </a:p>
         </p:txBody>
       </p:sp>
@@ -2396,7 +2397,7 @@
               </a:pPr>
               <a:t>‹#›</a:t>
             </a:fld>
-            <a:endParaRPr lang="ko-KR" altLang="en-US"/>
+            <a:endParaRPr lang="ko-KR" altLang="en-US" dirty="0"/>
           </a:p>
         </p:txBody>
       </p:sp>
@@ -2643,9 +2644,9 @@
               <a:pPr>
                 <a:defRPr/>
               </a:pPr>
-              <a:t>2020-09-06</a:t>
+              <a:t>2020-09-07</a:t>
             </a:fld>
-            <a:endParaRPr lang="ko-KR" altLang="en-US"/>
+            <a:endParaRPr lang="ko-KR" altLang="en-US" dirty="0"/>
           </a:p>
         </p:txBody>
       </p:sp>
@@ -2677,7 +2678,7 @@
             <a:pPr>
               <a:defRPr/>
             </a:pPr>
-            <a:endParaRPr lang="ko-KR" altLang="en-US"/>
+            <a:endParaRPr lang="ko-KR" altLang="en-US" dirty="0"/>
           </a:p>
         </p:txBody>
       </p:sp>
@@ -2716,7 +2717,7 @@
               </a:pPr>
               <a:t>‹#›</a:t>
             </a:fld>
-            <a:endParaRPr lang="ko-KR" altLang="en-US"/>
+            <a:endParaRPr lang="ko-KR" altLang="en-US" dirty="0"/>
           </a:p>
         </p:txBody>
       </p:sp>
@@ -2841,7 +2842,7 @@
           </a:lstStyle>
           <a:p>
             <a:pPr lvl="0"/>
-            <a:endParaRPr lang="ko-KR" altLang="en-US" noProof="0"/>
+            <a:endParaRPr lang="ko-KR" altLang="en-US" noProof="0" dirty="0"/>
           </a:p>
         </p:txBody>
       </p:sp>
@@ -2943,9 +2944,9 @@
               <a:pPr>
                 <a:defRPr/>
               </a:pPr>
-              <a:t>2020-09-06</a:t>
+              <a:t>2020-09-07</a:t>
             </a:fld>
-            <a:endParaRPr lang="ko-KR" altLang="en-US"/>
+            <a:endParaRPr lang="ko-KR" altLang="en-US" dirty="0"/>
           </a:p>
         </p:txBody>
       </p:sp>
@@ -2977,7 +2978,7 @@
             <a:pPr>
               <a:defRPr/>
             </a:pPr>
-            <a:endParaRPr lang="ko-KR" altLang="en-US"/>
+            <a:endParaRPr lang="ko-KR" altLang="en-US" dirty="0"/>
           </a:p>
         </p:txBody>
       </p:sp>
@@ -3016,7 +3017,7 @@
               </a:pPr>
               <a:t>‹#›</a:t>
             </a:fld>
-            <a:endParaRPr lang="ko-KR" altLang="en-US"/>
+            <a:endParaRPr lang="ko-KR" altLang="en-US" dirty="0"/>
           </a:p>
         </p:txBody>
       </p:sp>
@@ -3269,9 +3270,9 @@
               <a:pPr>
                 <a:defRPr/>
               </a:pPr>
-              <a:t>2020-09-06</a:t>
+              <a:t>2020-09-07</a:t>
             </a:fld>
-            <a:endParaRPr lang="ko-KR" altLang="en-US"/>
+            <a:endParaRPr lang="ko-KR" altLang="en-US" dirty="0"/>
           </a:p>
         </p:txBody>
       </p:sp>
@@ -3325,7 +3326,7 @@
             <a:pPr>
               <a:defRPr/>
             </a:pPr>
-            <a:endParaRPr lang="ko-KR" altLang="en-US"/>
+            <a:endParaRPr lang="ko-KR" altLang="en-US" dirty="0"/>
           </a:p>
         </p:txBody>
       </p:sp>
@@ -3386,7 +3387,7 @@
               </a:pPr>
               <a:t>‹#›</a:t>
             </a:fld>
-            <a:endParaRPr lang="ko-KR" altLang="en-US"/>
+            <a:endParaRPr lang="ko-KR" altLang="en-US" dirty="0"/>
           </a:p>
         </p:txBody>
       </p:sp>
@@ -3985,7 +3986,7 @@
               </a:spcAft>
               <a:defRPr/>
             </a:pPr>
-            <a:endParaRPr lang="ko-KR" altLang="en-US"/>
+            <a:endParaRPr lang="ko-KR" altLang="en-US" dirty="0"/>
           </a:p>
         </p:txBody>
       </p:sp>
@@ -4122,7 +4123,7 @@
                 <a:defRPr/>
               </a:pPr>
               <a:r>
-                <a:rPr lang="en-US" altLang="ko-KR" dirty="0" err="1">
+                <a:rPr lang="en-US" altLang="ko-KR" b="1" dirty="0" err="1">
                   <a:ln>
                     <a:solidFill>
                       <a:schemeClr val="accent1">
@@ -4140,7 +4141,7 @@
                 <a:t>비만도와</a:t>
               </a:r>
               <a:r>
-                <a:rPr lang="en-US" altLang="ko-KR" dirty="0">
+                <a:rPr lang="en-US" altLang="ko-KR" b="1" dirty="0">
                   <a:ln>
                     <a:solidFill>
                       <a:schemeClr val="accent1">
@@ -4158,7 +4159,7 @@
                 <a:t> </a:t>
               </a:r>
               <a:r>
-                <a:rPr lang="en-US" altLang="ko-KR" dirty="0" err="1">
+                <a:rPr lang="en-US" altLang="ko-KR" b="1" dirty="0" err="1">
                   <a:ln>
                     <a:solidFill>
                       <a:schemeClr val="accent1">
@@ -4176,7 +4177,7 @@
                 <a:t>야구와의</a:t>
               </a:r>
               <a:r>
-                <a:rPr lang="en-US" altLang="ko-KR" dirty="0">
+                <a:rPr lang="en-US" altLang="ko-KR" b="1" dirty="0">
                   <a:ln>
                     <a:solidFill>
                       <a:schemeClr val="accent1">
@@ -4194,7 +4195,7 @@
                 <a:t> </a:t>
               </a:r>
               <a:r>
-                <a:rPr lang="en-US" altLang="ko-KR" dirty="0" err="1">
+                <a:rPr lang="en-US" altLang="ko-KR" b="1" dirty="0" err="1">
                   <a:ln>
                     <a:solidFill>
                       <a:schemeClr val="accent1">
@@ -4212,7 +4213,7 @@
                 <a:t>관계는</a:t>
               </a:r>
               <a:r>
-                <a:rPr lang="en-US" altLang="ko-KR" dirty="0">
+                <a:rPr lang="en-US" altLang="ko-KR" b="1" dirty="0">
                   <a:ln>
                     <a:solidFill>
                       <a:schemeClr val="accent1">
@@ -4229,7 +4230,7 @@
                 </a:rPr>
                 <a:t>?</a:t>
               </a:r>
-              <a:endParaRPr lang="en-US" altLang="ko-KR" dirty="0">
+              <a:endParaRPr lang="en-US" altLang="ko-KR" b="1" dirty="0">
                 <a:ln>
                   <a:solidFill>
                     <a:srgbClr val="5B9BD5">
@@ -4248,6 +4249,408 @@
           </p:txBody>
         </p:sp>
       </p:grpSp>
+    </p:spTree>
+  </p:cSld>
+  <p:clrMapOvr>
+    <a:masterClrMapping/>
+  </p:clrMapOvr>
+</p:sld>
+</file>
+
+<file path=ppt/slides/slide10.xml><?xml version="1.0" encoding="utf-8"?>
+<p:sld xmlns:a="http://schemas.openxmlformats.org/drawingml/2006/main" xmlns:r="http://schemas.openxmlformats.org/officeDocument/2006/relationships" xmlns:p="http://schemas.openxmlformats.org/presentationml/2006/main">
+  <p:cSld>
+    <p:spTree>
+      <p:nvGrpSpPr>
+        <p:cNvPr id="1" name=""/>
+        <p:cNvGrpSpPr/>
+        <p:nvPr/>
+      </p:nvGrpSpPr>
+      <p:grpSpPr>
+        <a:xfrm>
+          <a:off x="0" y="0"/>
+          <a:ext cx="0" cy="0"/>
+          <a:chOff x="0" y="0"/>
+          <a:chExt cx="0" cy="0"/>
+        </a:xfrm>
+      </p:grpSpPr>
+      <p:pic>
+        <p:nvPicPr>
+          <p:cNvPr id="9218" name="그림 2">
+            <a:extLst>
+              <a:ext uri="{FF2B5EF4-FFF2-40B4-BE49-F238E27FC236}">
+                <a16:creationId xmlns:a16="http://schemas.microsoft.com/office/drawing/2014/main" id="{E3D83C6B-634E-4791-9B9D-2E2C4CDB0377}"/>
+              </a:ext>
+            </a:extLst>
+          </p:cNvPr>
+          <p:cNvPicPr>
+            <a:picLocks noChangeAspect="1" noChangeArrowheads="1"/>
+          </p:cNvPicPr>
+          <p:nvPr/>
+        </p:nvPicPr>
+        <p:blipFill>
+          <a:blip r:embed="rId2">
+            <a:extLst>
+              <a:ext uri="{28A0092B-C50C-407E-A947-70E740481C1C}">
+                <a14:useLocalDpi xmlns:a14="http://schemas.microsoft.com/office/drawing/2010/main" val="0"/>
+              </a:ext>
+            </a:extLst>
+          </a:blip>
+          <a:srcRect b="4404"/>
+          <a:stretch>
+            <a:fillRect/>
+          </a:stretch>
+        </p:blipFill>
+        <p:spPr bwMode="auto">
+          <a:xfrm>
+            <a:off x="0" y="0"/>
+            <a:ext cx="12192000" cy="6858000"/>
+          </a:xfrm>
+          <a:prstGeom prst="rect">
+            <a:avLst/>
+          </a:prstGeom>
+          <a:noFill/>
+          <a:ln>
+            <a:noFill/>
+          </a:ln>
+          <a:extLst>
+            <a:ext uri="{909E8E84-426E-40DD-AFC4-6F175D3DCCD1}">
+              <a14:hiddenFill xmlns:a14="http://schemas.microsoft.com/office/drawing/2010/main">
+                <a:solidFill>
+                  <a:srgbClr val="FFFFFF"/>
+                </a:solidFill>
+              </a14:hiddenFill>
+            </a:ext>
+            <a:ext uri="{91240B29-F687-4F45-9708-019B960494DF}">
+              <a14:hiddenLine xmlns:a14="http://schemas.microsoft.com/office/drawing/2010/main" w="9525">
+                <a:solidFill>
+                  <a:srgbClr val="000000"/>
+                </a:solidFill>
+                <a:miter lim="800000"/>
+                <a:headEnd/>
+                <a:tailEnd/>
+              </a14:hiddenLine>
+            </a:ext>
+          </a:extLst>
+        </p:spPr>
+      </p:pic>
+      <p:sp>
+        <p:nvSpPr>
+          <p:cNvPr id="2" name="직사각형 1">
+            <a:extLst>
+              <a:ext uri="{FF2B5EF4-FFF2-40B4-BE49-F238E27FC236}">
+                <a16:creationId xmlns:a16="http://schemas.microsoft.com/office/drawing/2014/main" id="{046F2D7A-FA09-4557-B0B6-7B4AAB1001BD}"/>
+              </a:ext>
+            </a:extLst>
+          </p:cNvPr>
+          <p:cNvSpPr/>
+          <p:nvPr/>
+        </p:nvSpPr>
+        <p:spPr>
+          <a:xfrm>
+            <a:off x="-17463" y="0"/>
+            <a:ext cx="3873501" cy="6858000"/>
+          </a:xfrm>
+          <a:prstGeom prst="rect">
+            <a:avLst/>
+          </a:prstGeom>
+          <a:solidFill>
+            <a:schemeClr val="tx1">
+              <a:alpha val="50000"/>
+            </a:schemeClr>
+          </a:solidFill>
+          <a:ln>
+            <a:noFill/>
+          </a:ln>
+        </p:spPr>
+        <p:style>
+          <a:lnRef idx="2">
+            <a:schemeClr val="accent1">
+              <a:shade val="50000"/>
+            </a:schemeClr>
+          </a:lnRef>
+          <a:fillRef idx="1">
+            <a:schemeClr val="accent1"/>
+          </a:fillRef>
+          <a:effectRef idx="0">
+            <a:schemeClr val="accent1"/>
+          </a:effectRef>
+          <a:fontRef idx="minor">
+            <a:schemeClr val="lt1"/>
+          </a:fontRef>
+        </p:style>
+        <p:txBody>
+          <a:bodyPr anchor="ctr"/>
+          <a:lstStyle/>
+          <a:p>
+            <a:pPr algn="ctr" eaLnBrk="1" fontAlgn="auto" latinLnBrk="1" hangingPunct="1">
+              <a:spcBef>
+                <a:spcPts val="0"/>
+              </a:spcBef>
+              <a:spcAft>
+                <a:spcPts val="0"/>
+              </a:spcAft>
+              <a:defRPr/>
+            </a:pPr>
+            <a:endParaRPr lang="ko-KR" altLang="en-US"/>
+          </a:p>
+        </p:txBody>
+      </p:sp>
+      <p:sp>
+        <p:nvSpPr>
+          <p:cNvPr id="3" name="직사각형 2">
+            <a:extLst>
+              <a:ext uri="{FF2B5EF4-FFF2-40B4-BE49-F238E27FC236}">
+                <a16:creationId xmlns:a16="http://schemas.microsoft.com/office/drawing/2014/main" id="{512C740D-7B83-4F76-BE83-06CCE2795D5F}"/>
+              </a:ext>
+            </a:extLst>
+          </p:cNvPr>
+          <p:cNvSpPr/>
+          <p:nvPr/>
+        </p:nvSpPr>
+        <p:spPr>
+          <a:xfrm>
+            <a:off x="517961" y="1808329"/>
+            <a:ext cx="2851556" cy="1908215"/>
+          </a:xfrm>
+          <a:prstGeom prst="rect">
+            <a:avLst/>
+          </a:prstGeom>
+        </p:spPr>
+        <p:txBody>
+          <a:bodyPr lIns="91440" tIns="45720" rIns="91440" bIns="45720" anchor="t">
+            <a:spAutoFit/>
+          </a:bodyPr>
+          <a:lstStyle/>
+          <a:p>
+            <a:pPr eaLnBrk="1" fontAlgn="auto" latinLnBrk="1" hangingPunct="1">
+              <a:spcBef>
+                <a:spcPts val="0"/>
+              </a:spcBef>
+              <a:spcAft>
+                <a:spcPts val="0"/>
+              </a:spcAft>
+              <a:defRPr/>
+            </a:pPr>
+            <a:r>
+              <a:rPr lang="ko-KR" altLang="en-US" sz="2800" b="1" dirty="0">
+                <a:ln>
+                  <a:solidFill>
+                    <a:srgbClr val="F51979">
+                      <a:alpha val="0"/>
+                    </a:srgbClr>
+                  </a:solidFill>
+                </a:ln>
+                <a:solidFill>
+                  <a:schemeClr val="bg1"/>
+                </a:solidFill>
+                <a:latin typeface="-윤고딕330" panose="02030504000101010101" pitchFamily="18" charset="-127"/>
+                <a:ea typeface="-윤고딕330"/>
+                <a:cs typeface="Arial"/>
+              </a:rPr>
+              <a:t>대</a:t>
+            </a:r>
+            <a:r>
+              <a:rPr lang="ko-KR" altLang="en-US" b="1" dirty="0">
+                <a:ln>
+                  <a:solidFill>
+                    <a:srgbClr val="F51979">
+                      <a:alpha val="0"/>
+                    </a:srgbClr>
+                  </a:solidFill>
+                </a:ln>
+                <a:solidFill>
+                  <a:schemeClr val="bg1"/>
+                </a:solidFill>
+                <a:latin typeface="-윤고딕330" panose="02030504000101010101" pitchFamily="18" charset="-127"/>
+                <a:ea typeface="-윤고딕330"/>
+                <a:cs typeface="Arial"/>
+              </a:rPr>
+              <a:t>체적으로 KBO 선수들은 비만도가가 높았고 고도비만에 가까울 수록 많은 홈런을 쳤다고 일반화 하긴 어렵지만 그런 성향을 보인다</a:t>
+            </a:r>
+            <a:r>
+              <a:rPr lang="en-US" altLang="ko-KR" b="1" dirty="0">
+                <a:ln>
+                  <a:solidFill>
+                    <a:srgbClr val="F51979">
+                      <a:alpha val="0"/>
+                    </a:srgbClr>
+                  </a:solidFill>
+                </a:ln>
+                <a:solidFill>
+                  <a:schemeClr val="bg1"/>
+                </a:solidFill>
+                <a:latin typeface="-윤고딕330" panose="02030504000101010101" pitchFamily="18" charset="-127"/>
+                <a:ea typeface="-윤고딕330"/>
+                <a:cs typeface="Arial"/>
+              </a:rPr>
+              <a:t>.</a:t>
+            </a:r>
+            <a:endParaRPr lang="ko-KR" altLang="en-US" b="1" dirty="0">
+              <a:ln>
+                <a:solidFill>
+                  <a:srgbClr val="F51979">
+                    <a:alpha val="0"/>
+                  </a:srgbClr>
+                </a:solidFill>
+              </a:ln>
+              <a:solidFill>
+                <a:schemeClr val="bg1"/>
+              </a:solidFill>
+              <a:latin typeface="-윤고딕330" panose="02030504000101010101" pitchFamily="18" charset="-127"/>
+              <a:ea typeface="-윤고딕330"/>
+              <a:cs typeface="Arial"/>
+            </a:endParaRPr>
+          </a:p>
+        </p:txBody>
+      </p:sp>
+      <p:sp>
+        <p:nvSpPr>
+          <p:cNvPr id="5" name="직사각형 4">
+            <a:extLst>
+              <a:ext uri="{FF2B5EF4-FFF2-40B4-BE49-F238E27FC236}">
+                <a16:creationId xmlns:a16="http://schemas.microsoft.com/office/drawing/2014/main" id="{643664E3-E439-411F-BFBF-1E4AFC81E087}"/>
+              </a:ext>
+            </a:extLst>
+          </p:cNvPr>
+          <p:cNvSpPr/>
+          <p:nvPr/>
+        </p:nvSpPr>
+        <p:spPr bwMode="auto">
+          <a:xfrm>
+            <a:off x="518713" y="789734"/>
+            <a:ext cx="2926165" cy="523220"/>
+          </a:xfrm>
+          <a:prstGeom prst="rect">
+            <a:avLst/>
+          </a:prstGeom>
+        </p:spPr>
+        <p:txBody>
+          <a:bodyPr wrap="square" lIns="91440" tIns="45720" rIns="91440" bIns="45720" anchor="t">
+            <a:spAutoFit/>
+          </a:bodyPr>
+          <a:lstStyle/>
+          <a:p>
+            <a:pPr algn="ctr" eaLnBrk="1" fontAlgn="auto" latinLnBrk="1" hangingPunct="1">
+              <a:spcBef>
+                <a:spcPts val="0"/>
+              </a:spcBef>
+              <a:spcAft>
+                <a:spcPts val="0"/>
+              </a:spcAft>
+              <a:defRPr/>
+            </a:pPr>
+            <a:r>
+              <a:rPr lang="ko-KR" altLang="en-US" sz="2800" b="1">
+                <a:ln>
+                  <a:solidFill>
+                    <a:srgbClr val="F51979">
+                      <a:alpha val="0"/>
+                    </a:srgbClr>
+                  </a:solidFill>
+                </a:ln>
+                <a:solidFill>
+                  <a:srgbClr val="E7E6E6"/>
+                </a:solidFill>
+                <a:latin typeface="-윤고딕330" panose="02030504000101010101" pitchFamily="18" charset="-127"/>
+                <a:ea typeface="-윤고딕330"/>
+                <a:cs typeface="Arial"/>
+              </a:rPr>
+              <a:t>BMI : 타자</a:t>
+            </a:r>
+            <a:endParaRPr lang="ko-KR" altLang="en-US" b="1">
+              <a:ln>
+                <a:solidFill>
+                  <a:srgbClr val="F51979">
+                    <a:alpha val="0"/>
+                  </a:srgbClr>
+                </a:solidFill>
+              </a:ln>
+              <a:solidFill>
+                <a:srgbClr val="E7E6E6"/>
+              </a:solidFill>
+              <a:latin typeface="-윤고딕330" panose="02030504000101010101" pitchFamily="18" charset="-127"/>
+              <a:ea typeface="-윤고딕330" panose="02030504000101010101" pitchFamily="18" charset="-127"/>
+              <a:cs typeface="Arial" panose="020B0604020202020204" pitchFamily="34" charset="0"/>
+            </a:endParaRPr>
+          </a:p>
+        </p:txBody>
+      </p:sp>
+      <p:sp>
+        <p:nvSpPr>
+          <p:cNvPr id="8" name="직사각형 7">
+            <a:extLst>
+              <a:ext uri="{FF2B5EF4-FFF2-40B4-BE49-F238E27FC236}">
+                <a16:creationId xmlns:a16="http://schemas.microsoft.com/office/drawing/2014/main" id="{49219605-32C3-4B31-B7E4-9163234EA7FC}"/>
+              </a:ext>
+            </a:extLst>
+          </p:cNvPr>
+          <p:cNvSpPr/>
+          <p:nvPr/>
+        </p:nvSpPr>
+        <p:spPr>
+          <a:xfrm>
+            <a:off x="517960" y="3972608"/>
+            <a:ext cx="2851556" cy="1908215"/>
+          </a:xfrm>
+          <a:prstGeom prst="rect">
+            <a:avLst/>
+          </a:prstGeom>
+        </p:spPr>
+        <p:txBody>
+          <a:bodyPr lIns="91440" tIns="45720" rIns="91440" bIns="45720" anchor="t">
+            <a:spAutoFit/>
+          </a:bodyPr>
+          <a:lstStyle/>
+          <a:p>
+            <a:pPr eaLnBrk="1" fontAlgn="auto" latinLnBrk="1" hangingPunct="1">
+              <a:spcBef>
+                <a:spcPts val="0"/>
+              </a:spcBef>
+              <a:spcAft>
+                <a:spcPts val="0"/>
+              </a:spcAft>
+              <a:defRPr/>
+            </a:pPr>
+            <a:r>
+              <a:rPr lang="ko-KR" altLang="en-US" sz="2800" b="1" dirty="0">
+                <a:ln>
+                  <a:solidFill>
+                    <a:srgbClr val="F51979">
+                      <a:alpha val="0"/>
+                    </a:srgbClr>
+                  </a:solidFill>
+                </a:ln>
+                <a:solidFill>
+                  <a:schemeClr val="bg1"/>
+                </a:solidFill>
+                <a:latin typeface="-윤고딕330" panose="02030504000101010101" pitchFamily="18" charset="-127"/>
+                <a:ea typeface="-윤고딕330"/>
+                <a:cs typeface="Arial"/>
+              </a:rPr>
+              <a:t>하</a:t>
+            </a:r>
+            <a:r>
+              <a:rPr lang="ko-KR" altLang="en-US" b="1" dirty="0">
+                <a:ln>
+                  <a:solidFill>
+                    <a:srgbClr val="F51979">
+                      <a:alpha val="0"/>
+                    </a:srgbClr>
+                  </a:solidFill>
+                </a:ln>
+                <a:solidFill>
+                  <a:schemeClr val="bg1"/>
+                </a:solidFill>
+                <a:latin typeface="-윤고딕330" panose="02030504000101010101" pitchFamily="18" charset="-127"/>
+                <a:ea typeface="-윤고딕330"/>
+                <a:cs typeface="Arial"/>
+              </a:rPr>
+              <a:t>지만 비만율이 장타율을 보장하진 않았다. 그리고 비만도가 높은 선수가 병살타를 당할 것이다 라는 것 또한 나만의 편견임을 깨닫게 되었다.</a:t>
+            </a:r>
+          </a:p>
+        </p:txBody>
+      </p:sp>
     </p:spTree>
   </p:cSld>
   <p:clrMapOvr>
@@ -5842,10 +6245,10 @@
         </p:nvGrpSpPr>
         <p:grpSpPr bwMode="auto">
           <a:xfrm>
-            <a:off x="603250" y="279400"/>
-            <a:ext cx="1400175" cy="368300"/>
+            <a:off x="603250" y="279399"/>
+            <a:ext cx="1400175" cy="369332"/>
             <a:chOff x="576759" y="2296526"/>
-            <a:chExt cx="1400655" cy="369332"/>
+            <a:chExt cx="1400655" cy="370367"/>
           </a:xfrm>
         </p:grpSpPr>
         <p:sp>
@@ -5863,7 +6266,7 @@
           <p:spPr>
             <a:xfrm>
               <a:off x="576759" y="2296526"/>
-              <a:ext cx="437940" cy="369332"/>
+              <a:ext cx="438090" cy="370367"/>
             </a:xfrm>
             <a:prstGeom prst="rect">
               <a:avLst/>
@@ -5898,7 +6301,7 @@
                   <a:latin typeface="-윤고딕360" panose="02030504000101010101" pitchFamily="18" charset="-127"/>
                   <a:ea typeface="-윤고딕360" panose="02030504000101010101" pitchFamily="18" charset="-127"/>
                 </a:rPr>
-                <a:t>02</a:t>
+                <a:t>03</a:t>
               </a:r>
               <a:endParaRPr lang="ko-KR" altLang="en-US" dirty="0">
                 <a:ln>
@@ -6337,10 +6740,10 @@
         </p:nvGrpSpPr>
         <p:grpSpPr bwMode="auto">
           <a:xfrm>
-            <a:off x="603250" y="279400"/>
-            <a:ext cx="1400175" cy="368300"/>
+            <a:off x="603250" y="279399"/>
+            <a:ext cx="1400175" cy="369332"/>
             <a:chOff x="576759" y="2296526"/>
-            <a:chExt cx="1400655" cy="369332"/>
+            <a:chExt cx="1400655" cy="370367"/>
           </a:xfrm>
         </p:grpSpPr>
         <p:sp>
@@ -6358,7 +6761,7 @@
           <p:spPr>
             <a:xfrm>
               <a:off x="576759" y="2296526"/>
-              <a:ext cx="437940" cy="369332"/>
+              <a:ext cx="438090" cy="370367"/>
             </a:xfrm>
             <a:prstGeom prst="rect">
               <a:avLst/>
@@ -6393,7 +6796,7 @@
                   <a:latin typeface="-윤고딕360" panose="02030504000101010101" pitchFamily="18" charset="-127"/>
                   <a:ea typeface="-윤고딕360" panose="02030504000101010101" pitchFamily="18" charset="-127"/>
                 </a:rPr>
-                <a:t>02</a:t>
+                <a:t>03</a:t>
               </a:r>
               <a:endParaRPr lang="ko-KR" altLang="en-US" dirty="0">
                 <a:ln>
@@ -7691,10 +8094,10 @@
         </p:nvGrpSpPr>
         <p:grpSpPr bwMode="auto">
           <a:xfrm>
-            <a:off x="603250" y="279400"/>
-            <a:ext cx="1400175" cy="368300"/>
+            <a:off x="603250" y="279399"/>
+            <a:ext cx="1400175" cy="369332"/>
             <a:chOff x="576759" y="2296526"/>
-            <a:chExt cx="1400655" cy="369332"/>
+            <a:chExt cx="1400655" cy="370367"/>
           </a:xfrm>
         </p:grpSpPr>
         <p:sp>
@@ -7712,7 +8115,7 @@
           <p:spPr>
             <a:xfrm>
               <a:off x="576759" y="2296526"/>
-              <a:ext cx="437940" cy="369332"/>
+              <a:ext cx="438090" cy="370367"/>
             </a:xfrm>
             <a:prstGeom prst="rect">
               <a:avLst/>
@@ -7747,7 +8150,7 @@
                   <a:latin typeface="-윤고딕360" panose="02030504000101010101" pitchFamily="18" charset="-127"/>
                   <a:ea typeface="-윤고딕360" panose="02030504000101010101" pitchFamily="18" charset="-127"/>
                 </a:rPr>
-                <a:t>04</a:t>
+                <a:t>05</a:t>
               </a:r>
               <a:endParaRPr lang="ko-KR" altLang="en-US" dirty="0">
                 <a:ln>
@@ -8365,10 +8768,10 @@
         </p:nvGrpSpPr>
         <p:grpSpPr bwMode="auto">
           <a:xfrm>
-            <a:off x="603250" y="279400"/>
-            <a:ext cx="1400175" cy="368300"/>
+            <a:off x="603250" y="279399"/>
+            <a:ext cx="1400175" cy="369332"/>
             <a:chOff x="576759" y="2296526"/>
-            <a:chExt cx="1400655" cy="369332"/>
+            <a:chExt cx="1400655" cy="370367"/>
           </a:xfrm>
         </p:grpSpPr>
         <p:sp>
@@ -8386,7 +8789,7 @@
           <p:spPr>
             <a:xfrm>
               <a:off x="576759" y="2296526"/>
-              <a:ext cx="437940" cy="369332"/>
+              <a:ext cx="438090" cy="370367"/>
             </a:xfrm>
             <a:prstGeom prst="rect">
               <a:avLst/>
@@ -8421,7 +8824,7 @@
                   <a:latin typeface="-윤고딕360" panose="02030504000101010101" pitchFamily="18" charset="-127"/>
                   <a:ea typeface="-윤고딕360" panose="02030504000101010101" pitchFamily="18" charset="-127"/>
                 </a:rPr>
-                <a:t>02</a:t>
+                <a:t>05</a:t>
               </a:r>
               <a:endParaRPr lang="ko-KR" altLang="en-US" dirty="0">
                 <a:ln>
@@ -8785,72 +9188,169 @@
           <a:chExt cx="0" cy="0"/>
         </a:xfrm>
       </p:grpSpPr>
-      <p:pic>
-        <p:nvPicPr>
-          <p:cNvPr id="9218" name="그림 2">
+      <p:grpSp>
+        <p:nvGrpSpPr>
+          <p:cNvPr id="5122" name="그룹 7">
             <a:extLst>
               <a:ext uri="{FF2B5EF4-FFF2-40B4-BE49-F238E27FC236}">
-                <a16:creationId xmlns:a16="http://schemas.microsoft.com/office/drawing/2014/main" id="{E3D83C6B-634E-4791-9B9D-2E2C4CDB0377}"/>
+                <a16:creationId xmlns:a16="http://schemas.microsoft.com/office/drawing/2014/main" id="{DEDF1C81-CE98-402F-941A-8ECA00808ADF}"/>
               </a:ext>
             </a:extLst>
           </p:cNvPr>
-          <p:cNvPicPr>
-            <a:picLocks noChangeAspect="1" noChangeArrowheads="1"/>
-          </p:cNvPicPr>
+          <p:cNvGrpSpPr>
+            <a:grpSpLocks/>
+          </p:cNvGrpSpPr>
           <p:nvPr/>
-        </p:nvPicPr>
-        <p:blipFill>
-          <a:blip r:embed="rId2">
-            <a:extLst>
-              <a:ext uri="{28A0092B-C50C-407E-A947-70E740481C1C}">
-                <a14:useLocalDpi xmlns:a14="http://schemas.microsoft.com/office/drawing/2010/main" val="0"/>
-              </a:ext>
-            </a:extLst>
-          </a:blip>
-          <a:srcRect b="4404"/>
-          <a:stretch>
-            <a:fillRect/>
-          </a:stretch>
-        </p:blipFill>
-        <p:spPr bwMode="auto">
+        </p:nvGrpSpPr>
+        <p:grpSpPr bwMode="auto">
           <a:xfrm>
-            <a:off x="0" y="0"/>
-            <a:ext cx="12192000" cy="6858000"/>
+            <a:off x="603250" y="279399"/>
+            <a:ext cx="1400175" cy="369332"/>
+            <a:chOff x="576759" y="2296526"/>
+            <a:chExt cx="1400655" cy="370367"/>
           </a:xfrm>
-          <a:prstGeom prst="rect">
-            <a:avLst/>
-          </a:prstGeom>
-          <a:noFill/>
-          <a:ln>
+        </p:grpSpPr>
+        <p:sp>
+          <p:nvSpPr>
+            <p:cNvPr id="9" name="TextBox 8">
+              <a:extLst>
+                <a:ext uri="{FF2B5EF4-FFF2-40B4-BE49-F238E27FC236}">
+                  <a16:creationId xmlns:a16="http://schemas.microsoft.com/office/drawing/2014/main" id="{A2DC2ED2-DE73-4102-A89D-1796A5980ACF}"/>
+                </a:ext>
+              </a:extLst>
+            </p:cNvPr>
+            <p:cNvSpPr txBox="1"/>
+            <p:nvPr/>
+          </p:nvSpPr>
+          <p:spPr>
+            <a:xfrm>
+              <a:off x="576759" y="2296526"/>
+              <a:ext cx="438090" cy="370367"/>
+            </a:xfrm>
+            <a:prstGeom prst="rect">
+              <a:avLst/>
+            </a:prstGeom>
             <a:noFill/>
-          </a:ln>
-          <a:extLst>
-            <a:ext uri="{909E8E84-426E-40DD-AFC4-6F175D3DCCD1}">
-              <a14:hiddenFill xmlns:a14="http://schemas.microsoft.com/office/drawing/2010/main">
-                <a:solidFill>
-                  <a:srgbClr val="FFFFFF"/>
-                </a:solidFill>
-              </a14:hiddenFill>
-            </a:ext>
-            <a:ext uri="{91240B29-F687-4F45-9708-019B960494DF}">
-              <a14:hiddenLine xmlns:a14="http://schemas.microsoft.com/office/drawing/2010/main" w="9525">
-                <a:solidFill>
-                  <a:srgbClr val="000000"/>
-                </a:solidFill>
-                <a:miter lim="800000"/>
-                <a:headEnd/>
-                <a:tailEnd/>
-              </a14:hiddenLine>
-            </a:ext>
-          </a:extLst>
-        </p:spPr>
-      </p:pic>
+          </p:spPr>
+          <p:txBody>
+            <a:bodyPr wrap="none">
+              <a:spAutoFit/>
+            </a:bodyPr>
+            <a:lstStyle/>
+            <a:p>
+              <a:pPr eaLnBrk="1" fontAlgn="auto" latinLnBrk="1" hangingPunct="1">
+                <a:spcBef>
+                  <a:spcPts val="0"/>
+                </a:spcBef>
+                <a:spcAft>
+                  <a:spcPts val="0"/>
+                </a:spcAft>
+                <a:defRPr/>
+              </a:pPr>
+              <a:r>
+                <a:rPr lang="en-US" altLang="ko-KR" dirty="0">
+                  <a:ln>
+                    <a:solidFill>
+                      <a:schemeClr val="accent1">
+                        <a:shade val="50000"/>
+                        <a:alpha val="0"/>
+                      </a:schemeClr>
+                    </a:solidFill>
+                  </a:ln>
+                  <a:latin typeface="-윤고딕360" panose="02030504000101010101" pitchFamily="18" charset="-127"/>
+                  <a:ea typeface="-윤고딕360" panose="02030504000101010101" pitchFamily="18" charset="-127"/>
+                </a:rPr>
+                <a:t>06</a:t>
+              </a:r>
+              <a:endParaRPr lang="ko-KR" altLang="en-US" dirty="0">
+                <a:ln>
+                  <a:solidFill>
+                    <a:schemeClr val="accent1">
+                      <a:shade val="50000"/>
+                      <a:alpha val="0"/>
+                    </a:schemeClr>
+                  </a:solidFill>
+                </a:ln>
+                <a:latin typeface="-윤고딕360" panose="02030504000101010101" pitchFamily="18" charset="-127"/>
+                <a:ea typeface="-윤고딕360" panose="02030504000101010101" pitchFamily="18" charset="-127"/>
+              </a:endParaRPr>
+            </a:p>
+          </p:txBody>
+        </p:sp>
+        <p:sp>
+          <p:nvSpPr>
+            <p:cNvPr id="10" name="TextBox 9">
+              <a:extLst>
+                <a:ext uri="{FF2B5EF4-FFF2-40B4-BE49-F238E27FC236}">
+                  <a16:creationId xmlns:a16="http://schemas.microsoft.com/office/drawing/2014/main" id="{66CA88CD-C729-44C5-8A64-7F944BFEEDF9}"/>
+                </a:ext>
+              </a:extLst>
+            </p:cNvPr>
+            <p:cNvSpPr txBox="1"/>
+            <p:nvPr/>
+          </p:nvSpPr>
+          <p:spPr>
+            <a:xfrm>
+              <a:off x="903081" y="2296526"/>
+              <a:ext cx="1074333" cy="369332"/>
+            </a:xfrm>
+            <a:prstGeom prst="rect">
+              <a:avLst/>
+            </a:prstGeom>
+            <a:noFill/>
+          </p:spPr>
+          <p:txBody>
+            <a:bodyPr wrap="none">
+              <a:spAutoFit/>
+            </a:bodyPr>
+            <a:lstStyle/>
+            <a:p>
+              <a:pPr eaLnBrk="1" fontAlgn="auto" latinLnBrk="1" hangingPunct="1">
+                <a:spcBef>
+                  <a:spcPts val="0"/>
+                </a:spcBef>
+                <a:spcAft>
+                  <a:spcPts val="0"/>
+                </a:spcAft>
+                <a:defRPr/>
+              </a:pPr>
+              <a:r>
+                <a:rPr lang="en-US" altLang="ko-KR" dirty="0">
+                  <a:ln>
+                    <a:solidFill>
+                      <a:schemeClr val="accent1">
+                        <a:shade val="50000"/>
+                        <a:alpha val="0"/>
+                      </a:schemeClr>
+                    </a:solidFill>
+                  </a:ln>
+                  <a:latin typeface="-윤고딕360" panose="02030504000101010101" pitchFamily="18" charset="-127"/>
+                  <a:ea typeface="-윤고딕360" panose="02030504000101010101" pitchFamily="18" charset="-127"/>
+                </a:rPr>
+                <a:t>Content</a:t>
+              </a:r>
+              <a:endParaRPr lang="ko-KR" altLang="en-US" dirty="0">
+                <a:ln>
+                  <a:solidFill>
+                    <a:schemeClr val="accent1">
+                      <a:shade val="50000"/>
+                      <a:alpha val="0"/>
+                    </a:schemeClr>
+                  </a:solidFill>
+                </a:ln>
+                <a:latin typeface="-윤고딕360" panose="02030504000101010101" pitchFamily="18" charset="-127"/>
+                <a:ea typeface="-윤고딕360" panose="02030504000101010101" pitchFamily="18" charset="-127"/>
+              </a:endParaRPr>
+            </a:p>
+          </p:txBody>
+        </p:sp>
+      </p:grpSp>
       <p:sp>
         <p:nvSpPr>
-          <p:cNvPr id="2" name="직사각형 1">
+          <p:cNvPr id="18" name="직사각형 17">
             <a:extLst>
               <a:ext uri="{FF2B5EF4-FFF2-40B4-BE49-F238E27FC236}">
-                <a16:creationId xmlns:a16="http://schemas.microsoft.com/office/drawing/2014/main" id="{046F2D7A-FA09-4557-B0B6-7B4AAB1001BD}"/>
+                <a16:creationId xmlns:a16="http://schemas.microsoft.com/office/drawing/2014/main" id="{84704557-0908-49BB-904A-98B1645B350D}"/>
               </a:ext>
             </a:extLst>
           </p:cNvPr>
@@ -8859,19 +9359,491 @@
         </p:nvSpPr>
         <p:spPr>
           <a:xfrm>
-            <a:off x="-17463" y="0"/>
-            <a:ext cx="3873501" cy="6858000"/>
+            <a:off x="576304" y="1107136"/>
+            <a:ext cx="11039392" cy="523220"/>
           </a:xfrm>
           <a:prstGeom prst="rect">
             <a:avLst/>
           </a:prstGeom>
-          <a:solidFill>
-            <a:schemeClr val="tx1">
-              <a:alpha val="50000"/>
-            </a:schemeClr>
-          </a:solidFill>
-          <a:ln>
-            <a:noFill/>
+        </p:spPr>
+        <p:txBody>
+          <a:bodyPr lIns="91440" tIns="45720" rIns="91440" bIns="45720" anchor="t">
+            <a:spAutoFit/>
+          </a:bodyPr>
+          <a:lstStyle/>
+          <a:p>
+            <a:pPr eaLnBrk="1" fontAlgn="auto" latinLnBrk="1" hangingPunct="1">
+              <a:spcBef>
+                <a:spcPts val="0"/>
+              </a:spcBef>
+              <a:spcAft>
+                <a:spcPts val="0"/>
+              </a:spcAft>
+              <a:defRPr/>
+            </a:pPr>
+            <a:r>
+              <a:rPr lang="ko-KR" altLang="en-US" sz="2800" b="1" dirty="0">
+                <a:ln>
+                  <a:solidFill>
+                    <a:srgbClr val="F51979">
+                      <a:alpha val="0"/>
+                    </a:srgbClr>
+                  </a:solidFill>
+                </a:ln>
+                <a:latin typeface="-윤고딕330" panose="02030504000101010101" pitchFamily="18" charset="-127"/>
+                <a:ea typeface="-윤고딕330"/>
+                <a:cs typeface="Arial"/>
+              </a:rPr>
+              <a:t>너</a:t>
+            </a:r>
+            <a:r>
+              <a:rPr lang="ko-KR" altLang="en-US" sz="1600" b="1" dirty="0">
+                <a:ln>
+                  <a:solidFill>
+                    <a:srgbClr val="F51979">
+                      <a:alpha val="0"/>
+                    </a:srgbClr>
+                  </a:solidFill>
+                </a:ln>
+                <a:latin typeface="-윤고딕330" panose="02030504000101010101" pitchFamily="18" charset="-127"/>
+                <a:ea typeface="-윤고딕330"/>
+                <a:cs typeface="Arial"/>
+              </a:rPr>
+              <a:t>의 홈런 잠재력을 알려줘 </a:t>
+            </a:r>
+            <a:r>
+              <a:rPr lang="en-US" altLang="ko-KR" sz="1600" b="1" dirty="0">
+                <a:ln>
+                  <a:solidFill>
+                    <a:srgbClr val="F51979">
+                      <a:alpha val="0"/>
+                    </a:srgbClr>
+                  </a:solidFill>
+                </a:ln>
+                <a:latin typeface="-윤고딕330" panose="02030504000101010101" pitchFamily="18" charset="-127"/>
+                <a:ea typeface="-윤고딕330"/>
+                <a:cs typeface="Arial"/>
+              </a:rPr>
+              <a:t>?</a:t>
+            </a:r>
+            <a:endParaRPr lang="ko-KR" altLang="en-US" sz="1600" b="1" dirty="0">
+              <a:ln>
+                <a:solidFill>
+                  <a:srgbClr val="F51979">
+                    <a:alpha val="0"/>
+                  </a:srgbClr>
+                </a:solidFill>
+              </a:ln>
+              <a:latin typeface="-윤고딕330" panose="02030504000101010101" pitchFamily="18" charset="-127"/>
+              <a:ea typeface="-윤고딕330" panose="02030504000101010101" pitchFamily="18" charset="-127"/>
+              <a:cs typeface="Arial" panose="020B0604020202020204" pitchFamily="34" charset="0"/>
+            </a:endParaRPr>
+          </a:p>
+        </p:txBody>
+      </p:sp>
+      <p:sp>
+        <p:nvSpPr>
+          <p:cNvPr id="11" name="직사각형 10">
+            <a:extLst>
+              <a:ext uri="{FF2B5EF4-FFF2-40B4-BE49-F238E27FC236}">
+                <a16:creationId xmlns:a16="http://schemas.microsoft.com/office/drawing/2014/main" id="{FB44308E-C426-475B-A096-EEF5BFC815B6}"/>
+              </a:ext>
+            </a:extLst>
+          </p:cNvPr>
+          <p:cNvSpPr/>
+          <p:nvPr/>
+        </p:nvSpPr>
+        <p:spPr bwMode="auto">
+          <a:xfrm>
+            <a:off x="609675" y="5357045"/>
+            <a:ext cx="6083226" cy="800219"/>
+          </a:xfrm>
+          <a:prstGeom prst="rect">
+            <a:avLst/>
+          </a:prstGeom>
+        </p:spPr>
+        <p:txBody>
+          <a:bodyPr wrap="square" lIns="91440" tIns="45720" rIns="91440" bIns="45720" anchor="t">
+            <a:spAutoFit/>
+          </a:bodyPr>
+          <a:lstStyle/>
+          <a:p>
+            <a:pPr eaLnBrk="1" fontAlgn="auto" latinLnBrk="1" hangingPunct="1">
+              <a:spcBef>
+                <a:spcPts val="0"/>
+              </a:spcBef>
+              <a:spcAft>
+                <a:spcPts val="0"/>
+              </a:spcAft>
+              <a:defRPr/>
+            </a:pPr>
+            <a:r>
+              <a:rPr lang="en-US" altLang="ko-KR" sz="2800" b="1" dirty="0">
+                <a:ln>
+                  <a:solidFill>
+                    <a:srgbClr val="F51979">
+                      <a:alpha val="0"/>
+                    </a:srgbClr>
+                  </a:solidFill>
+                </a:ln>
+                <a:solidFill>
+                  <a:srgbClr val="000000"/>
+                </a:solidFill>
+                <a:latin typeface="-윤고딕330" panose="02030504000101010101" pitchFamily="18" charset="-127"/>
+                <a:ea typeface="-윤고딕330"/>
+                <a:cs typeface="Arial"/>
+              </a:rPr>
+              <a:t>2</a:t>
+            </a:r>
+            <a:r>
+              <a:rPr lang="en-US" altLang="ko-KR" b="1" dirty="0">
+                <a:ln>
+                  <a:solidFill>
+                    <a:srgbClr val="F51979">
+                      <a:alpha val="0"/>
+                    </a:srgbClr>
+                  </a:solidFill>
+                </a:ln>
+                <a:solidFill>
+                  <a:srgbClr val="000000"/>
+                </a:solidFill>
+                <a:latin typeface="-윤고딕330" panose="02030504000101010101" pitchFamily="18" charset="-127"/>
+                <a:ea typeface="-윤고딕330"/>
+                <a:cs typeface="Arial"/>
+              </a:rPr>
+              <a:t>020 </a:t>
+            </a:r>
+            <a:r>
+              <a:rPr lang="en-US" altLang="ko-KR" b="1" dirty="0" err="1">
+                <a:ln>
+                  <a:solidFill>
+                    <a:srgbClr val="F51979">
+                      <a:alpha val="0"/>
+                    </a:srgbClr>
+                  </a:solidFill>
+                </a:ln>
+                <a:solidFill>
+                  <a:srgbClr val="000000"/>
+                </a:solidFill>
+                <a:latin typeface="-윤고딕330" panose="02030504000101010101" pitchFamily="18" charset="-127"/>
+                <a:ea typeface="-윤고딕330"/>
+                <a:cs typeface="Arial"/>
+              </a:rPr>
+              <a:t>kbo</a:t>
+            </a:r>
+            <a:r>
+              <a:rPr lang="en-US" altLang="ko-KR" b="1" dirty="0">
+                <a:ln>
+                  <a:solidFill>
+                    <a:srgbClr val="F51979">
+                      <a:alpha val="0"/>
+                    </a:srgbClr>
+                  </a:solidFill>
+                </a:ln>
+                <a:solidFill>
+                  <a:srgbClr val="000000"/>
+                </a:solidFill>
+                <a:latin typeface="-윤고딕330" panose="02030504000101010101" pitchFamily="18" charset="-127"/>
+                <a:ea typeface="-윤고딕330"/>
+                <a:cs typeface="Arial"/>
+              </a:rPr>
+              <a:t> </a:t>
+            </a:r>
+            <a:r>
+              <a:rPr lang="ko-KR" altLang="en-US" b="1" dirty="0">
+                <a:ln>
+                  <a:solidFill>
+                    <a:srgbClr val="F51979">
+                      <a:alpha val="0"/>
+                    </a:srgbClr>
+                  </a:solidFill>
+                </a:ln>
+                <a:solidFill>
+                  <a:srgbClr val="000000"/>
+                </a:solidFill>
+                <a:latin typeface="-윤고딕330" panose="02030504000101010101" pitchFamily="18" charset="-127"/>
+                <a:ea typeface="-윤고딕330"/>
+                <a:cs typeface="Arial"/>
+              </a:rPr>
+              <a:t>데이터에 선형회귀를 이용해 </a:t>
+            </a:r>
+            <a:r>
+              <a:rPr lang="en-US" altLang="ko-KR" b="1" dirty="0">
+                <a:ln>
+                  <a:solidFill>
+                    <a:srgbClr val="F51979">
+                      <a:alpha val="0"/>
+                    </a:srgbClr>
+                  </a:solidFill>
+                </a:ln>
+                <a:solidFill>
+                  <a:srgbClr val="000000"/>
+                </a:solidFill>
+                <a:latin typeface="-윤고딕330" panose="02030504000101010101" pitchFamily="18" charset="-127"/>
+                <a:ea typeface="-윤고딕330"/>
+                <a:cs typeface="Arial"/>
+              </a:rPr>
+              <a:t>User</a:t>
+            </a:r>
+            <a:r>
+              <a:rPr lang="ko-KR" altLang="en-US" b="1" dirty="0">
+                <a:ln>
+                  <a:solidFill>
+                    <a:srgbClr val="F51979">
+                      <a:alpha val="0"/>
+                    </a:srgbClr>
+                  </a:solidFill>
+                </a:ln>
+                <a:solidFill>
+                  <a:srgbClr val="000000"/>
+                </a:solidFill>
+                <a:latin typeface="-윤고딕330" panose="02030504000101010101" pitchFamily="18" charset="-127"/>
+                <a:ea typeface="-윤고딕330"/>
+                <a:cs typeface="Arial"/>
+              </a:rPr>
+              <a:t>의 비만도를 토대로 홈런 개수를 알려주는 서비스</a:t>
+            </a:r>
+            <a:r>
+              <a:rPr lang="en-US" altLang="ko-KR" b="1" dirty="0">
+                <a:ln>
+                  <a:solidFill>
+                    <a:srgbClr val="F51979">
+                      <a:alpha val="0"/>
+                    </a:srgbClr>
+                  </a:solidFill>
+                </a:ln>
+                <a:solidFill>
+                  <a:srgbClr val="000000"/>
+                </a:solidFill>
+                <a:latin typeface="-윤고딕330" panose="02030504000101010101" pitchFamily="18" charset="-127"/>
+                <a:ea typeface="-윤고딕330"/>
+                <a:cs typeface="Arial"/>
+              </a:rPr>
+              <a:t>.</a:t>
+            </a:r>
+            <a:endParaRPr lang="ko-KR" altLang="en-US" b="1" dirty="0">
+              <a:ln>
+                <a:solidFill>
+                  <a:srgbClr val="F51979">
+                    <a:alpha val="0"/>
+                  </a:srgbClr>
+                </a:solidFill>
+              </a:ln>
+              <a:solidFill>
+                <a:srgbClr val="000000"/>
+              </a:solidFill>
+              <a:latin typeface="-윤고딕330" panose="02030504000101010101" pitchFamily="18" charset="-127"/>
+              <a:ea typeface="-윤고딕330" panose="02030504000101010101" pitchFamily="18" charset="-127"/>
+              <a:cs typeface="Arial" panose="020B0604020202020204" pitchFamily="34" charset="0"/>
+            </a:endParaRPr>
+          </a:p>
+        </p:txBody>
+      </p:sp>
+      <p:pic>
+        <p:nvPicPr>
+          <p:cNvPr id="2" name="그림 1">
+            <a:extLst>
+              <a:ext uri="{FF2B5EF4-FFF2-40B4-BE49-F238E27FC236}">
+                <a16:creationId xmlns:a16="http://schemas.microsoft.com/office/drawing/2014/main" id="{27E2ED48-495E-4E54-916B-9F835588A1AB}"/>
+              </a:ext>
+            </a:extLst>
+          </p:cNvPr>
+          <p:cNvPicPr>
+            <a:picLocks noChangeAspect="1"/>
+          </p:cNvPicPr>
+          <p:nvPr/>
+        </p:nvPicPr>
+        <p:blipFill>
+          <a:blip r:embed="rId2"/>
+          <a:stretch>
+            <a:fillRect/>
+          </a:stretch>
+        </p:blipFill>
+        <p:spPr>
+          <a:xfrm>
+            <a:off x="6357589" y="1107136"/>
+            <a:ext cx="1538435" cy="636594"/>
+          </a:xfrm>
+          <a:prstGeom prst="rect">
+            <a:avLst/>
+          </a:prstGeom>
+        </p:spPr>
+      </p:pic>
+      <p:pic>
+        <p:nvPicPr>
+          <p:cNvPr id="3" name="그림 2">
+            <a:extLst>
+              <a:ext uri="{FF2B5EF4-FFF2-40B4-BE49-F238E27FC236}">
+                <a16:creationId xmlns:a16="http://schemas.microsoft.com/office/drawing/2014/main" id="{6FCA9871-993A-47A9-8A08-07954E7C2B91}"/>
+              </a:ext>
+            </a:extLst>
+          </p:cNvPr>
+          <p:cNvPicPr>
+            <a:picLocks noChangeAspect="1"/>
+          </p:cNvPicPr>
+          <p:nvPr/>
+        </p:nvPicPr>
+        <p:blipFill>
+          <a:blip r:embed="rId3"/>
+          <a:stretch>
+            <a:fillRect/>
+          </a:stretch>
+        </p:blipFill>
+        <p:spPr>
+          <a:xfrm>
+            <a:off x="6898752" y="1801985"/>
+            <a:ext cx="1679924" cy="633744"/>
+          </a:xfrm>
+          <a:prstGeom prst="rect">
+            <a:avLst/>
+          </a:prstGeom>
+        </p:spPr>
+      </p:pic>
+      <p:pic>
+        <p:nvPicPr>
+          <p:cNvPr id="4" name="그림 3">
+            <a:extLst>
+              <a:ext uri="{FF2B5EF4-FFF2-40B4-BE49-F238E27FC236}">
+                <a16:creationId xmlns:a16="http://schemas.microsoft.com/office/drawing/2014/main" id="{7411E84B-017D-4922-83E3-E27266CAC62B}"/>
+              </a:ext>
+            </a:extLst>
+          </p:cNvPr>
+          <p:cNvPicPr>
+            <a:picLocks noChangeAspect="1"/>
+          </p:cNvPicPr>
+          <p:nvPr/>
+        </p:nvPicPr>
+        <p:blipFill>
+          <a:blip r:embed="rId4"/>
+          <a:stretch>
+            <a:fillRect/>
+          </a:stretch>
+        </p:blipFill>
+        <p:spPr>
+          <a:xfrm>
+            <a:off x="7126806" y="2595276"/>
+            <a:ext cx="4391025" cy="438150"/>
+          </a:xfrm>
+          <a:prstGeom prst="rect">
+            <a:avLst/>
+          </a:prstGeom>
+        </p:spPr>
+      </p:pic>
+      <p:pic>
+        <p:nvPicPr>
+          <p:cNvPr id="13" name="그림 12">
+            <a:extLst>
+              <a:ext uri="{FF2B5EF4-FFF2-40B4-BE49-F238E27FC236}">
+                <a16:creationId xmlns:a16="http://schemas.microsoft.com/office/drawing/2014/main" id="{432A41AA-F6F5-4F03-910E-5ECCABF084C1}"/>
+              </a:ext>
+            </a:extLst>
+          </p:cNvPr>
+          <p:cNvPicPr>
+            <a:picLocks noChangeAspect="1"/>
+          </p:cNvPicPr>
+          <p:nvPr/>
+        </p:nvPicPr>
+        <p:blipFill>
+          <a:blip r:embed="rId5"/>
+          <a:stretch>
+            <a:fillRect/>
+          </a:stretch>
+        </p:blipFill>
+        <p:spPr>
+          <a:xfrm>
+            <a:off x="6304193" y="3310730"/>
+            <a:ext cx="1600472" cy="633744"/>
+          </a:xfrm>
+          <a:prstGeom prst="rect">
+            <a:avLst/>
+          </a:prstGeom>
+        </p:spPr>
+      </p:pic>
+      <p:pic>
+        <p:nvPicPr>
+          <p:cNvPr id="14" name="그림 13">
+            <a:extLst>
+              <a:ext uri="{FF2B5EF4-FFF2-40B4-BE49-F238E27FC236}">
+                <a16:creationId xmlns:a16="http://schemas.microsoft.com/office/drawing/2014/main" id="{EB7C87A1-7019-4BFA-83C2-475BCEB506C2}"/>
+              </a:ext>
+            </a:extLst>
+          </p:cNvPr>
+          <p:cNvPicPr>
+            <a:picLocks noChangeAspect="1"/>
+          </p:cNvPicPr>
+          <p:nvPr/>
+        </p:nvPicPr>
+        <p:blipFill>
+          <a:blip r:embed="rId6"/>
+          <a:stretch>
+            <a:fillRect/>
+          </a:stretch>
+        </p:blipFill>
+        <p:spPr>
+          <a:xfrm>
+            <a:off x="6811523" y="4116103"/>
+            <a:ext cx="1643774" cy="633744"/>
+          </a:xfrm>
+          <a:prstGeom prst="rect">
+            <a:avLst/>
+          </a:prstGeom>
+        </p:spPr>
+      </p:pic>
+      <p:pic>
+        <p:nvPicPr>
+          <p:cNvPr id="15" name="그림 14">
+            <a:extLst>
+              <a:ext uri="{FF2B5EF4-FFF2-40B4-BE49-F238E27FC236}">
+                <a16:creationId xmlns:a16="http://schemas.microsoft.com/office/drawing/2014/main" id="{BE586A3D-BB58-4BDA-AE28-FA798173F97F}"/>
+              </a:ext>
+            </a:extLst>
+          </p:cNvPr>
+          <p:cNvPicPr>
+            <a:picLocks noChangeAspect="1"/>
+          </p:cNvPicPr>
+          <p:nvPr/>
+        </p:nvPicPr>
+        <p:blipFill>
+          <a:blip r:embed="rId7"/>
+          <a:stretch>
+            <a:fillRect/>
+          </a:stretch>
+        </p:blipFill>
+        <p:spPr>
+          <a:xfrm>
+            <a:off x="7126806" y="4903067"/>
+            <a:ext cx="4615180" cy="438150"/>
+          </a:xfrm>
+          <a:prstGeom prst="rect">
+            <a:avLst/>
+          </a:prstGeom>
+        </p:spPr>
+      </p:pic>
+      <p:sp>
+        <p:nvSpPr>
+          <p:cNvPr id="19" name="직사각형 18">
+            <a:extLst>
+              <a:ext uri="{FF2B5EF4-FFF2-40B4-BE49-F238E27FC236}">
+                <a16:creationId xmlns:a16="http://schemas.microsoft.com/office/drawing/2014/main" id="{8CDB918B-6932-4420-A2B4-84F1CA193ECB}"/>
+              </a:ext>
+            </a:extLst>
+          </p:cNvPr>
+          <p:cNvSpPr/>
+          <p:nvPr/>
+        </p:nvSpPr>
+        <p:spPr>
+          <a:xfrm>
+            <a:off x="7633410" y="4894410"/>
+            <a:ext cx="271255" cy="194240"/>
+          </a:xfrm>
+          <a:prstGeom prst="rect">
+            <a:avLst/>
+          </a:prstGeom>
+          <a:noFill/>
+          <a:ln w="28575">
+            <a:solidFill>
+              <a:srgbClr val="FFC000"/>
+            </a:solidFill>
           </a:ln>
         </p:spPr>
         <p:style>
@@ -8891,28 +9863,20 @@
           </a:fontRef>
         </p:style>
         <p:txBody>
-          <a:bodyPr anchor="ctr"/>
+          <a:bodyPr rtlCol="0" anchor="ctr"/>
           <a:lstStyle/>
           <a:p>
-            <a:pPr algn="ctr" eaLnBrk="1" fontAlgn="auto" latinLnBrk="1" hangingPunct="1">
-              <a:spcBef>
-                <a:spcPts val="0"/>
-              </a:spcBef>
-              <a:spcAft>
-                <a:spcPts val="0"/>
-              </a:spcAft>
-              <a:defRPr/>
-            </a:pPr>
+            <a:pPr algn="ctr"/>
             <a:endParaRPr lang="ko-KR" altLang="en-US"/>
           </a:p>
         </p:txBody>
       </p:sp>
       <p:sp>
         <p:nvSpPr>
-          <p:cNvPr id="3" name="직사각형 2">
+          <p:cNvPr id="20" name="직사각형 19">
             <a:extLst>
               <a:ext uri="{FF2B5EF4-FFF2-40B4-BE49-F238E27FC236}">
-                <a16:creationId xmlns:a16="http://schemas.microsoft.com/office/drawing/2014/main" id="{512C740D-7B83-4F76-BE83-06CCE2795D5F}"/>
+                <a16:creationId xmlns:a16="http://schemas.microsoft.com/office/drawing/2014/main" id="{C27CEB48-D17E-4AFE-BBA1-670F521FBC56}"/>
               </a:ext>
             </a:extLst>
           </p:cNvPr>
@@ -8921,281 +9885,97 @@
         </p:nvSpPr>
         <p:spPr>
           <a:xfrm>
-            <a:off x="517961" y="1808329"/>
-            <a:ext cx="2851556" cy="1354217"/>
+            <a:off x="7706234" y="2596687"/>
+            <a:ext cx="271255" cy="194240"/>
           </a:xfrm>
           <a:prstGeom prst="rect">
             <a:avLst/>
           </a:prstGeom>
+          <a:noFill/>
+          <a:ln w="28575">
+            <a:solidFill>
+              <a:srgbClr val="FFC000"/>
+            </a:solidFill>
+          </a:ln>
         </p:spPr>
+        <p:style>
+          <a:lnRef idx="2">
+            <a:schemeClr val="accent1">
+              <a:shade val="50000"/>
+            </a:schemeClr>
+          </a:lnRef>
+          <a:fillRef idx="1">
+            <a:schemeClr val="accent1"/>
+          </a:fillRef>
+          <a:effectRef idx="0">
+            <a:schemeClr val="accent1"/>
+          </a:effectRef>
+          <a:fontRef idx="minor">
+            <a:schemeClr val="lt1"/>
+          </a:fontRef>
+        </p:style>
         <p:txBody>
-          <a:bodyPr lIns="91440" tIns="45720" rIns="91440" bIns="45720" anchor="t">
-            <a:spAutoFit/>
-          </a:bodyPr>
+          <a:bodyPr rtlCol="0" anchor="ctr"/>
           <a:lstStyle/>
           <a:p>
-            <a:pPr eaLnBrk="1" fontAlgn="auto" latinLnBrk="1" hangingPunct="1">
-              <a:spcBef>
-                <a:spcPts val="0"/>
-              </a:spcBef>
-              <a:spcAft>
-                <a:spcPts val="0"/>
-              </a:spcAft>
-              <a:defRPr/>
-            </a:pPr>
-            <a:r>
-              <a:rPr lang="ko-KR" altLang="en-US" sz="2800" b="1" dirty="0">
-                <a:ln>
-                  <a:solidFill>
-                    <a:srgbClr val="F51979">
-                      <a:alpha val="0"/>
-                    </a:srgbClr>
-                  </a:solidFill>
-                </a:ln>
-                <a:solidFill>
-                  <a:schemeClr val="bg1"/>
-                </a:solidFill>
-                <a:latin typeface="-윤고딕330" panose="02030504000101010101" pitchFamily="18" charset="-127"/>
-                <a:ea typeface="-윤고딕330"/>
-                <a:cs typeface="Arial"/>
-              </a:rPr>
-              <a:t>대</a:t>
-            </a:r>
-            <a:r>
-              <a:rPr lang="ko-KR" altLang="en-US" b="1" dirty="0">
-                <a:ln>
-                  <a:solidFill>
-                    <a:srgbClr val="F51979">
-                      <a:alpha val="0"/>
-                    </a:srgbClr>
-                  </a:solidFill>
-                </a:ln>
-                <a:solidFill>
-                  <a:schemeClr val="bg1"/>
-                </a:solidFill>
-                <a:latin typeface="-윤고딕330" panose="02030504000101010101" pitchFamily="18" charset="-127"/>
-                <a:ea typeface="-윤고딕330"/>
-                <a:cs typeface="Arial"/>
-              </a:rPr>
-              <a:t>체적으로 KBO 선수들</a:t>
-            </a:r>
-            <a:r>
-              <a:rPr lang="ko-KR" altLang="en-US" b="1">
-                <a:ln>
-                  <a:solidFill>
-                    <a:srgbClr val="F51979">
-                      <a:alpha val="0"/>
-                    </a:srgbClr>
-                  </a:solidFill>
-                </a:ln>
-                <a:solidFill>
-                  <a:schemeClr val="bg1"/>
-                </a:solidFill>
-                <a:latin typeface="-윤고딕330" panose="02030504000101010101" pitchFamily="18" charset="-127"/>
-                <a:ea typeface="-윤고딕330"/>
-                <a:cs typeface="Arial"/>
-              </a:rPr>
-              <a:t>은 BMI가 높았고 BMI가 높은 선수들이 홈런을 많이 때렸다. </a:t>
-            </a:r>
-            <a:endParaRPr lang="ko-KR" altLang="en-US" b="1" dirty="0">
-              <a:ln>
-                <a:solidFill>
-                  <a:srgbClr val="F51979">
-                    <a:alpha val="0"/>
-                  </a:srgbClr>
-                </a:solidFill>
-              </a:ln>
-              <a:solidFill>
-                <a:schemeClr val="bg1"/>
-              </a:solidFill>
-              <a:latin typeface="-윤고딕330" panose="02030504000101010101" pitchFamily="18" charset="-127"/>
-              <a:ea typeface="-윤고딕330"/>
-              <a:cs typeface="Arial"/>
-            </a:endParaRPr>
+            <a:pPr algn="ctr"/>
+            <a:endParaRPr lang="ko-KR" altLang="en-US"/>
           </a:p>
         </p:txBody>
       </p:sp>
-      <p:sp>
-        <p:nvSpPr>
-          <p:cNvPr id="5" name="직사각형 4">
+      <p:pic>
+        <p:nvPicPr>
+          <p:cNvPr id="1026" name="Picture 2">
             <a:extLst>
               <a:ext uri="{FF2B5EF4-FFF2-40B4-BE49-F238E27FC236}">
-                <a16:creationId xmlns:a16="http://schemas.microsoft.com/office/drawing/2014/main" id="{643664E3-E439-411F-BFBF-1E4AFC81E087}"/>
+                <a16:creationId xmlns:a16="http://schemas.microsoft.com/office/drawing/2014/main" id="{924518AE-DD42-42A7-B079-92A5736DBC91}"/>
               </a:ext>
             </a:extLst>
           </p:cNvPr>
-          <p:cNvSpPr/>
+          <p:cNvPicPr>
+            <a:picLocks noChangeAspect="1" noChangeArrowheads="1"/>
+          </p:cNvPicPr>
           <p:nvPr/>
-        </p:nvSpPr>
+        </p:nvPicPr>
+        <p:blipFill>
+          <a:blip r:embed="rId8">
+            <a:extLst>
+              <a:ext uri="{28A0092B-C50C-407E-A947-70E740481C1C}">
+                <a14:useLocalDpi xmlns:a14="http://schemas.microsoft.com/office/drawing/2010/main" val="0"/>
+              </a:ext>
+            </a:extLst>
+          </a:blip>
+          <a:srcRect/>
+          <a:stretch>
+            <a:fillRect/>
+          </a:stretch>
+        </p:blipFill>
         <p:spPr bwMode="auto">
           <a:xfrm>
-            <a:off x="518713" y="789734"/>
-            <a:ext cx="2926165" cy="523220"/>
+            <a:off x="609675" y="1907159"/>
+            <a:ext cx="4737142" cy="3308858"/>
           </a:xfrm>
           <a:prstGeom prst="rect">
             <a:avLst/>
           </a:prstGeom>
+          <a:noFill/>
+          <a:extLst>
+            <a:ext uri="{909E8E84-426E-40DD-AFC4-6F175D3DCCD1}">
+              <a14:hiddenFill xmlns:a14="http://schemas.microsoft.com/office/drawing/2010/main">
+                <a:solidFill>
+                  <a:srgbClr val="FFFFFF"/>
+                </a:solidFill>
+              </a14:hiddenFill>
+            </a:ext>
+          </a:extLst>
         </p:spPr>
-        <p:txBody>
-          <a:bodyPr wrap="square" lIns="91440" tIns="45720" rIns="91440" bIns="45720" anchor="t">
-            <a:spAutoFit/>
-          </a:bodyPr>
-          <a:lstStyle/>
-          <a:p>
-            <a:pPr algn="ctr" eaLnBrk="1" fontAlgn="auto" latinLnBrk="1" hangingPunct="1">
-              <a:spcBef>
-                <a:spcPts val="0"/>
-              </a:spcBef>
-              <a:spcAft>
-                <a:spcPts val="0"/>
-              </a:spcAft>
-              <a:defRPr/>
-            </a:pPr>
-            <a:r>
-              <a:rPr lang="ko-KR" altLang="en-US" sz="2800" b="1">
-                <a:ln>
-                  <a:solidFill>
-                    <a:srgbClr val="F51979">
-                      <a:alpha val="0"/>
-                    </a:srgbClr>
-                  </a:solidFill>
-                </a:ln>
-                <a:solidFill>
-                  <a:srgbClr val="E7E6E6"/>
-                </a:solidFill>
-                <a:latin typeface="-윤고딕330" panose="02030504000101010101" pitchFamily="18" charset="-127"/>
-                <a:ea typeface="-윤고딕330"/>
-                <a:cs typeface="Arial"/>
-              </a:rPr>
-              <a:t>BMI : 타자</a:t>
-            </a:r>
-            <a:endParaRPr lang="ko-KR" altLang="en-US" b="1">
-              <a:ln>
-                <a:solidFill>
-                  <a:srgbClr val="F51979">
-                    <a:alpha val="0"/>
-                  </a:srgbClr>
-                </a:solidFill>
-              </a:ln>
-              <a:solidFill>
-                <a:srgbClr val="E7E6E6"/>
-              </a:solidFill>
-              <a:latin typeface="-윤고딕330" panose="02030504000101010101" pitchFamily="18" charset="-127"/>
-              <a:ea typeface="-윤고딕330" panose="02030504000101010101" pitchFamily="18" charset="-127"/>
-              <a:cs typeface="Arial" panose="020B0604020202020204" pitchFamily="34" charset="0"/>
-            </a:endParaRPr>
-          </a:p>
-        </p:txBody>
-      </p:sp>
-      <p:sp>
-        <p:nvSpPr>
-          <p:cNvPr id="8" name="직사각형 7">
-            <a:extLst>
-              <a:ext uri="{FF2B5EF4-FFF2-40B4-BE49-F238E27FC236}">
-                <a16:creationId xmlns:a16="http://schemas.microsoft.com/office/drawing/2014/main" id="{49219605-32C3-4B31-B7E4-9163234EA7FC}"/>
-              </a:ext>
-            </a:extLst>
-          </p:cNvPr>
-          <p:cNvSpPr/>
-          <p:nvPr/>
-        </p:nvSpPr>
-        <p:spPr>
-          <a:xfrm>
-            <a:off x="517960" y="3426508"/>
-            <a:ext cx="2851556" cy="1908215"/>
-          </a:xfrm>
-          <a:prstGeom prst="rect">
-            <a:avLst/>
-          </a:prstGeom>
-        </p:spPr>
-        <p:txBody>
-          <a:bodyPr lIns="91440" tIns="45720" rIns="91440" bIns="45720" anchor="t">
-            <a:spAutoFit/>
-          </a:bodyPr>
-          <a:lstStyle/>
-          <a:p>
-            <a:pPr eaLnBrk="1" fontAlgn="auto" latinLnBrk="1" hangingPunct="1">
-              <a:spcBef>
-                <a:spcPts val="0"/>
-              </a:spcBef>
-              <a:spcAft>
-                <a:spcPts val="0"/>
-              </a:spcAft>
-              <a:defRPr/>
-            </a:pPr>
-            <a:r>
-              <a:rPr lang="ko-KR" altLang="en-US" sz="2800" b="1" dirty="0">
-                <a:ln>
-                  <a:solidFill>
-                    <a:srgbClr val="F51979">
-                      <a:alpha val="0"/>
-                    </a:srgbClr>
-                  </a:solidFill>
-                </a:ln>
-                <a:solidFill>
-                  <a:schemeClr val="bg1"/>
-                </a:solidFill>
-                <a:latin typeface="-윤고딕330" panose="02030504000101010101" pitchFamily="18" charset="-127"/>
-                <a:ea typeface="-윤고딕330"/>
-                <a:cs typeface="Arial"/>
-              </a:rPr>
-              <a:t>하</a:t>
-            </a:r>
-            <a:r>
-              <a:rPr lang="ko-KR" altLang="en-US" b="1" dirty="0">
-                <a:ln>
-                  <a:solidFill>
-                    <a:srgbClr val="F51979">
-                      <a:alpha val="0"/>
-                    </a:srgbClr>
-                  </a:solidFill>
-                </a:ln>
-                <a:solidFill>
-                  <a:schemeClr val="bg1"/>
-                </a:solidFill>
-                <a:latin typeface="-윤고딕330" panose="02030504000101010101" pitchFamily="18" charset="-127"/>
-                <a:ea typeface="-윤고딕330"/>
-                <a:cs typeface="Arial"/>
-              </a:rPr>
-              <a:t>지만 비만율이 장타율을 보장하진 않았다. 그리고 비만도가 높은 선수가 </a:t>
-            </a:r>
-            <a:r>
-              <a:rPr lang="ko-KR" altLang="en-US" b="1">
-                <a:ln>
-                  <a:solidFill>
-                    <a:srgbClr val="F51979">
-                      <a:alpha val="0"/>
-                    </a:srgbClr>
-                  </a:solidFill>
-                </a:ln>
-                <a:solidFill>
-                  <a:schemeClr val="bg1"/>
-                </a:solidFill>
-                <a:latin typeface="-윤고딕330" panose="02030504000101010101" pitchFamily="18" charset="-127"/>
-                <a:ea typeface="-윤고딕330"/>
-                <a:cs typeface="Arial"/>
-              </a:rPr>
-              <a:t>병살타를 당할것이다 라는 것 또한 나만의 편견임을 깨닫게 되었다.</a:t>
-            </a:r>
-            <a:endParaRPr lang="ko-KR" altLang="en-US" b="1" dirty="0">
-              <a:ln>
-                <a:solidFill>
-                  <a:srgbClr val="F51979">
-                    <a:alpha val="0"/>
-                  </a:srgbClr>
-                </a:solidFill>
-              </a:ln>
-              <a:solidFill>
-                <a:schemeClr val="bg1"/>
-              </a:solidFill>
-              <a:latin typeface="-윤고딕330" panose="02030504000101010101" pitchFamily="18" charset="-127"/>
-              <a:ea typeface="-윤고딕330"/>
-              <a:cs typeface="Arial"/>
-            </a:endParaRPr>
-          </a:p>
-        </p:txBody>
-      </p:sp>
+      </p:pic>
     </p:spTree>
+    <p:extLst>
+      <p:ext uri="{BB962C8B-B14F-4D97-AF65-F5344CB8AC3E}">
+        <p14:creationId xmlns:p14="http://schemas.microsoft.com/office/powerpoint/2010/main" val="1517153480"/>
+      </p:ext>
+    </p:extLst>
   </p:cSld>
   <p:clrMapOvr>
     <a:masterClrMapping/>

</xml_diff>